<commit_message>
update materials and zenodo DOI
</commit_message>
<xml_diff>
--- a/EDI_Publishing/Macrosystems_EDDIE_Module_8_DecisionSupport/Editable_versions_all_files/Getting_Started_with_Shiny_FINAL.pptx
+++ b/EDI_Publishing/Macrosystems_EDDIE_Module_8_DecisionSupport/Editable_versions_all_files/Getting_Started_with_Shiny_FINAL.pptx
@@ -17,7 +17,7 @@
     <p:sldId id="262" r:id="rId8"/>
     <p:sldId id="263" r:id="rId9"/>
     <p:sldId id="264" r:id="rId10"/>
-    <p:sldId id="358" r:id="rId11"/>
+    <p:sldId id="372" r:id="rId11"/>
     <p:sldId id="364" r:id="rId12"/>
   </p:sldIdLst>
   <p:sldSz cx="9144000" cy="6858000" type="screen4x3"/>
@@ -242,7 +242,7 @@
           <a:p>
             <a:fld id="{A82DDFCD-3F30-1944-ABA1-69872AECA504}" type="datetimeFigureOut">
               <a:rPr lang="en-US" smtClean="0"/>
-              <a:t>7/14/2021</a:t>
+              <a:t>8/25/2022</a:t>
             </a:fld>
             <a:endParaRPr lang="en-US"/>
           </a:p>
@@ -1093,7 +1093,7 @@
           <a:p>
             <a:fld id="{1DF94D92-C448-4579-B07F-32E6DEFE663F}" type="datetime1">
               <a:rPr lang="en-US" smtClean="0"/>
-              <a:t>7/14/2021</a:t>
+              <a:t>8/25/2022</a:t>
             </a:fld>
             <a:endParaRPr lang="en-US"/>
           </a:p>
@@ -1296,7 +1296,7 @@
           <a:p>
             <a:fld id="{B9B9F908-2237-4E06-9F65-308A0C7C8360}" type="datetime1">
               <a:rPr lang="en-US" smtClean="0"/>
-              <a:t>7/14/2021</a:t>
+              <a:t>8/25/2022</a:t>
             </a:fld>
             <a:endParaRPr lang="en-US"/>
           </a:p>
@@ -1476,7 +1476,7 @@
           <a:p>
             <a:fld id="{0959C69C-A580-4E24-B56C-3104E0D70A78}" type="datetime1">
               <a:rPr lang="en-US" smtClean="0"/>
-              <a:t>7/14/2021</a:t>
+              <a:t>8/25/2022</a:t>
             </a:fld>
             <a:endParaRPr lang="en-US"/>
           </a:p>
@@ -1712,7 +1712,7 @@
           <a:p>
             <a:fld id="{D8D700E8-F4C3-418D-8F0B-98F92EA7D957}" type="datetime1">
               <a:rPr lang="en-US" smtClean="0"/>
-              <a:t>7/14/2021</a:t>
+              <a:t>8/25/2022</a:t>
             </a:fld>
             <a:endParaRPr lang="en-US"/>
           </a:p>
@@ -1960,7 +1960,7 @@
           <a:p>
             <a:fld id="{C7B253FB-B5EE-4F6E-AEF1-5A70BE8EC8F4}" type="datetime1">
               <a:rPr lang="en-US" smtClean="0"/>
-              <a:t>7/14/2021</a:t>
+              <a:t>8/25/2022</a:t>
             </a:fld>
             <a:endParaRPr lang="en-US"/>
           </a:p>
@@ -2282,7 +2282,7 @@
           <a:p>
             <a:fld id="{C6E16F7D-6513-4591-A873-8EA03FD8E2FA}" type="datetime1">
               <a:rPr lang="en-US" smtClean="0"/>
-              <a:t>7/14/2021</a:t>
+              <a:t>8/25/2022</a:t>
             </a:fld>
             <a:endParaRPr lang="en-US"/>
           </a:p>
@@ -2753,7 +2753,7 @@
           <a:p>
             <a:fld id="{484FF8CE-54E3-4482-9C96-B30823D6975F}" type="datetime1">
               <a:rPr lang="en-US" smtClean="0"/>
-              <a:t>7/14/2021</a:t>
+              <a:t>8/25/2022</a:t>
             </a:fld>
             <a:endParaRPr lang="en-US"/>
           </a:p>
@@ -2905,7 +2905,7 @@
           <a:p>
             <a:fld id="{70AB9494-44A4-4B56-9C86-DEEA67A930FA}" type="datetime1">
               <a:rPr lang="en-US" smtClean="0"/>
-              <a:t>7/14/2021</a:t>
+              <a:t>8/25/2022</a:t>
             </a:fld>
             <a:endParaRPr lang="en-US"/>
           </a:p>
@@ -3000,7 +3000,7 @@
           <a:p>
             <a:fld id="{2A3DDFCE-9A45-4088-A795-328B2A4D0393}" type="datetime1">
               <a:rPr lang="en-US" smtClean="0"/>
-              <a:t>7/14/2021</a:t>
+              <a:t>8/25/2022</a:t>
             </a:fld>
             <a:endParaRPr lang="en-US"/>
           </a:p>
@@ -3279,7 +3279,7 @@
           <a:p>
             <a:fld id="{7DFF054A-2AA5-4FCC-B50D-79DF96EEDB5C}" type="datetime1">
               <a:rPr lang="en-US" smtClean="0"/>
-              <a:t>7/14/2021</a:t>
+              <a:t>8/25/2022</a:t>
             </a:fld>
             <a:endParaRPr lang="en-US"/>
           </a:p>
@@ -3589,7 +3589,7 @@
           <a:p>
             <a:fld id="{21215959-AF93-4A72-9756-D43DBD37659F}" type="datetime1">
               <a:rPr lang="en-US" smtClean="0"/>
-              <a:t>7/14/2021</a:t>
+              <a:t>8/25/2022</a:t>
             </a:fld>
             <a:endParaRPr lang="en-US"/>
           </a:p>
@@ -3892,7 +3892,7 @@
           <a:p>
             <a:fld id="{1810413B-1DC0-4E02-8B37-9A210213BAC0}" type="datetime1">
               <a:rPr lang="en-US" smtClean="0"/>
-              <a:t>7/14/2021</a:t>
+              <a:t>8/25/2022</a:t>
             </a:fld>
             <a:endParaRPr lang="en-US"/>
           </a:p>
@@ -4433,9 +4433,54 @@
                 <a:solidFill>
                   <a:srgbClr val="000000"/>
                 </a:solidFill>
+              </a:rPr>
+              <a:t>Woelmer, W.M., T.N. Moore, R.Q. Thomas, and C.C. Carey. 25 August 2022. </a:t>
+            </a:r>
+          </a:p>
+          <a:p>
+            <a:pPr algn="ctr"/>
+            <a:r>
+              <a:rPr lang="en-US" sz="1800" dirty="0">
+                <a:solidFill>
+                  <a:srgbClr val="000000"/>
+                </a:solidFill>
+              </a:rPr>
+              <a:t>Macrosystems EDDIE: Using Ecological Forecasts to Guide Decision Making</a:t>
+            </a:r>
+          </a:p>
+          <a:p>
+            <a:pPr algn="ctr"/>
+            <a:r>
+              <a:rPr lang="en-US" sz="1800" dirty="0">
+                <a:solidFill>
+                  <a:srgbClr val="000000"/>
+                </a:solidFill>
+              </a:rPr>
+              <a:t>Macrosystems EDDIE Module 8, Version 2. </a:t>
+            </a:r>
+          </a:p>
+          <a:p>
+            <a:pPr algn="ctr"/>
+            <a:r>
+              <a:rPr lang="en-US" sz="1800" u="sng" dirty="0">
+                <a:solidFill>
+                  <a:srgbClr val="0000FF"/>
+                </a:solidFill>
+                <a:effectLst/>
                 <a:latin typeface="Calibri" panose="020F0502020204030204" pitchFamily="34" charset="0"/>
+                <a:ea typeface="MS Mincho" panose="02020609040205080304" pitchFamily="49" charset="-128"/>
+                <a:cs typeface="Times New Roman" panose="02020603050405020304" pitchFamily="18" charset="0"/>
               </a:rPr>
-              <a:t>Moore, T. N., Carey, C.C., Thomas, R. Q. 23 January 2021. </a:t>
+              <a:t>https://serc.carleton.edu/eddie/macrosystems/module8</a:t>
+            </a:r>
+            <a:r>
+              <a:rPr lang="en-US" sz="1800" dirty="0">
+                <a:effectLst/>
+                <a:latin typeface="Calibri" panose="020F0502020204030204" pitchFamily="34" charset="0"/>
+                <a:ea typeface="MS Mincho" panose="02020609040205080304" pitchFamily="49" charset="-128"/>
+                <a:cs typeface="Times New Roman" panose="02020603050405020304" pitchFamily="18" charset="0"/>
+              </a:rPr>
+              <a:t>. </a:t>
             </a:r>
           </a:p>
           <a:p>
@@ -4445,54 +4490,38 @@
                 <a:solidFill>
                   <a:srgbClr val="000000"/>
                 </a:solidFill>
-                <a:latin typeface="Calibri" panose="020F0502020204030204" pitchFamily="34" charset="0"/>
               </a:rPr>
-              <a:t>Macrosystems EDDIE: Introduction to Ecological Forecasting. </a:t>
-            </a:r>
-          </a:p>
-          <a:p>
-            <a:pPr algn="ctr"/>
+              <a:t>Module development was supported </a:t>
+            </a:r>
             <a:r>
               <a:rPr lang="en-US" sz="1800" dirty="0">
                 <a:solidFill>
-                  <a:srgbClr val="000000"/>
-                </a:solidFill>
-                <a:latin typeface="Calibri" panose="020F0502020204030204" pitchFamily="34" charset="0"/>
+                  <a:schemeClr val="tx1"/>
+                </a:solidFill>
+                <a:latin typeface="+mj-lt"/>
               </a:rPr>
-              <a:t>Macrosystems EDDIE Module 5, Version 1. </a:t>
-            </a:r>
-          </a:p>
-          <a:p>
-            <a:pPr algn="ctr"/>
-            <a:r>
-              <a:rPr lang="en-US" sz="1600" dirty="0">
-                <a:solidFill>
-                  <a:srgbClr val="000000"/>
-                </a:solidFill>
-                <a:latin typeface="Calibri" panose="020F0502020204030204" pitchFamily="34" charset="0"/>
+              <a:t>by </a:t>
+            </a:r>
+            <a:r>
+              <a:rPr lang="en-US" sz="1800" dirty="0">
+                <a:solidFill>
+                  <a:schemeClr val="tx1"/>
+                </a:solidFill>
+                <a:effectLst/>
+                <a:latin typeface="+mj-lt"/>
+                <a:ea typeface="MS Mincho" panose="02020609040205080304" pitchFamily="49" charset="-128"/>
+                <a:cs typeface="Times New Roman" panose="02020603050405020304" pitchFamily="18" charset="0"/>
               </a:rPr>
-              <a:t>http://module5.macrosystemseddie.org</a:t>
+              <a:t>NSF grants DEB-1926050 and DBI-1922016</a:t>
             </a:r>
             <a:r>
               <a:rPr lang="en-US" sz="1800" dirty="0">
                 <a:solidFill>
-                  <a:srgbClr val="000000"/>
-                </a:solidFill>
-                <a:latin typeface="Calibri" panose="020F0502020204030204" pitchFamily="34" charset="0"/>
+                  <a:schemeClr val="tx1"/>
+                </a:solidFill>
+                <a:latin typeface="+mj-lt"/>
               </a:rPr>
-              <a:t> </a:t>
-            </a:r>
-          </a:p>
-          <a:p>
-            <a:pPr algn="ctr"/>
-            <a:r>
-              <a:rPr lang="en-US" sz="1800" dirty="0">
-                <a:solidFill>
-                  <a:srgbClr val="000000"/>
-                </a:solidFill>
-                <a:latin typeface="Calibri" panose="020F0502020204030204" pitchFamily="34" charset="0"/>
-              </a:rPr>
-              <a:t>Module development supported by NSF DEB-1926050; NSF DBI-1933016</a:t>
+              <a:t>.</a:t>
             </a:r>
           </a:p>
         </p:txBody>
@@ -4628,40 +4657,12 @@
           <a:chExt cx="0" cy="0"/>
         </a:xfrm>
       </p:grpSpPr>
-      <p:sp>
-        <p:nvSpPr>
-          <p:cNvPr id="2" name="Title 1">
+      <p:pic>
+        <p:nvPicPr>
+          <p:cNvPr id="11" name="Picture 10">
             <a:extLst>
               <a:ext uri="{FF2B5EF4-FFF2-40B4-BE49-F238E27FC236}">
-                <a16:creationId xmlns:a16="http://schemas.microsoft.com/office/drawing/2014/main" id="{AA155D5F-5823-4D4A-8026-31874B307281}"/>
-              </a:ext>
-            </a:extLst>
-          </p:cNvPr>
-          <p:cNvSpPr>
-            <a:spLocks noGrp="1"/>
-          </p:cNvSpPr>
-          <p:nvPr>
-            <p:ph type="title"/>
-          </p:nvPr>
-        </p:nvSpPr>
-        <p:spPr/>
-        <p:txBody>
-          <a:bodyPr/>
-          <a:lstStyle/>
-          <a:p>
-            <a:r>
-              <a:rPr lang="en-IE" dirty="0"/>
-              <a:t>Saving &amp; Resuming Progress</a:t>
-            </a:r>
-          </a:p>
-        </p:txBody>
-      </p:sp>
-      <p:pic>
-        <p:nvPicPr>
-          <p:cNvPr id="4" name="Picture 3">
-            <a:extLst>
-              <a:ext uri="{FF2B5EF4-FFF2-40B4-BE49-F238E27FC236}">
-                <a16:creationId xmlns:a16="http://schemas.microsoft.com/office/drawing/2014/main" id="{5D32B81C-039F-4CD5-8AD3-5364689ADD39}"/>
+                <a16:creationId xmlns:a16="http://schemas.microsoft.com/office/drawing/2014/main" id="{CCA28640-0DFD-E17F-7BC9-3E408DEC3377}"/>
               </a:ext>
             </a:extLst>
           </p:cNvPr>
@@ -4678,19 +4679,47 @@
         </p:blipFill>
         <p:spPr>
           <a:xfrm>
-            <a:off x="4636770" y="2078355"/>
-            <a:ext cx="4476750" cy="3676650"/>
+            <a:off x="5084387" y="4091454"/>
+            <a:ext cx="3620005" cy="2324424"/>
           </a:xfrm>
           <a:prstGeom prst="rect">
             <a:avLst/>
           </a:prstGeom>
-          <a:ln w="12700">
+          <a:ln w="28575">
             <a:solidFill>
               <a:schemeClr val="tx1"/>
             </a:solidFill>
           </a:ln>
         </p:spPr>
       </p:pic>
+      <p:sp>
+        <p:nvSpPr>
+          <p:cNvPr id="2" name="Title 1">
+            <a:extLst>
+              <a:ext uri="{FF2B5EF4-FFF2-40B4-BE49-F238E27FC236}">
+                <a16:creationId xmlns:a16="http://schemas.microsoft.com/office/drawing/2014/main" id="{AA155D5F-5823-4D4A-8026-31874B307281}"/>
+              </a:ext>
+            </a:extLst>
+          </p:cNvPr>
+          <p:cNvSpPr>
+            <a:spLocks noGrp="1"/>
+          </p:cNvSpPr>
+          <p:nvPr>
+            <p:ph type="title"/>
+          </p:nvPr>
+        </p:nvSpPr>
+        <p:spPr/>
+        <p:txBody>
+          <a:bodyPr/>
+          <a:lstStyle/>
+          <a:p>
+            <a:r>
+              <a:rPr lang="en-IE" dirty="0"/>
+              <a:t>Saving &amp; Resuming Progress</a:t>
+            </a:r>
+          </a:p>
+        </p:txBody>
+      </p:sp>
       <p:sp>
         <p:nvSpPr>
           <p:cNvPr id="3" name="Content Placeholder 2">
@@ -4710,7 +4739,7 @@
         <p:spPr>
           <a:xfrm>
             <a:off x="207010" y="1600200"/>
-            <a:ext cx="4364991" cy="4876800"/>
+            <a:ext cx="4300221" cy="4876800"/>
           </a:xfrm>
         </p:spPr>
         <p:txBody>
@@ -4719,13 +4748,22 @@
           </a:bodyPr>
           <a:lstStyle/>
           <a:p>
+            <a:pPr marL="0" indent="0">
+              <a:buNone/>
+            </a:pPr>
+            <a:r>
+              <a:rPr lang="en-IE" dirty="0"/>
+              <a:t>Saving Progress</a:t>
+            </a:r>
+          </a:p>
+          <a:p>
             <a:pPr marL="457200" indent="-457200">
               <a:buFont typeface="+mj-lt"/>
               <a:buAutoNum type="arabicPeriod"/>
             </a:pPr>
             <a:r>
               <a:rPr lang="en-IE" dirty="0"/>
-              <a:t>Navigate to the “Introduction” tab</a:t>
+              <a:t>Scroll to bottom of the page</a:t>
             </a:r>
           </a:p>
           <a:p>
@@ -4735,7 +4773,15 @@
             </a:pPr>
             <a:r>
               <a:rPr lang="en-IE" dirty="0"/>
-              <a:t>Scroll down to “Save your progress” section</a:t>
+              <a:t>Click on the “Save Progress” button. An ‘.</a:t>
+            </a:r>
+            <a:r>
+              <a:rPr lang="en-IE" dirty="0" err="1"/>
+              <a:t>eddie</a:t>
+            </a:r>
+            <a:r>
+              <a:rPr lang="en-IE" dirty="0"/>
+              <a:t>’ file will download. Your computer might prompt you to open this in R. This will not work, it only works for uploading to the Shiny app</a:t>
             </a:r>
           </a:p>
           <a:p>
@@ -4745,15 +4791,16 @@
             </a:pPr>
             <a:r>
               <a:rPr lang="en-IE" dirty="0"/>
-              <a:t>Click on the “Download user input” button. A ‘.</a:t>
-            </a:r>
-            <a:r>
-              <a:rPr lang="en-IE" dirty="0" err="1"/>
-              <a:t>eddie</a:t>
-            </a:r>
+              <a:t>Store this file somewhere safe on your computer</a:t>
+            </a:r>
+          </a:p>
+          <a:p>
+            <a:pPr marL="0" indent="0">
+              <a:buNone/>
+            </a:pPr>
             <a:r>
               <a:rPr lang="en-IE" dirty="0"/>
-              <a:t>’ file will download. Your computer might prompt you to open this in R. This will not work, it only works for uploading to the Shiny app</a:t>
+              <a:t>Resuming progress</a:t>
             </a:r>
           </a:p>
           <a:p>
@@ -4763,7 +4810,7 @@
             </a:pPr>
             <a:r>
               <a:rPr lang="en-IE" dirty="0"/>
-              <a:t>Store this file somewhere safe on your computer</a:t>
+              <a:t>Scroll to the top of the page</a:t>
             </a:r>
           </a:p>
           <a:p>
@@ -4773,7 +4820,25 @@
             </a:pPr>
             <a:r>
               <a:rPr lang="en-IE" dirty="0"/>
-              <a:t>When continuing, you will upload this file and it will populate your answers and saved parameters</a:t>
+              <a:t>Upload the ‘.</a:t>
+            </a:r>
+            <a:r>
+              <a:rPr lang="en-IE" dirty="0" err="1"/>
+              <a:t>eddie</a:t>
+            </a:r>
+            <a:r>
+              <a:rPr lang="en-IE" dirty="0"/>
+              <a:t>’ file</a:t>
+            </a:r>
+          </a:p>
+          <a:p>
+            <a:pPr marL="457200" indent="-457200">
+              <a:buFont typeface="+mj-lt"/>
+              <a:buAutoNum type="arabicPeriod"/>
+            </a:pPr>
+            <a:r>
+              <a:rPr lang="en-IE" dirty="0"/>
+              <a:t>This will populate your  saved text answers and saved parameters</a:t>
             </a:r>
           </a:p>
           <a:p>
@@ -4785,6 +4850,41 @@
           </a:p>
         </p:txBody>
       </p:sp>
+      <p:pic>
+        <p:nvPicPr>
+          <p:cNvPr id="12" name="Picture 11">
+            <a:extLst>
+              <a:ext uri="{FF2B5EF4-FFF2-40B4-BE49-F238E27FC236}">
+                <a16:creationId xmlns:a16="http://schemas.microsoft.com/office/drawing/2014/main" id="{BAF5A4CA-438C-4465-86F0-B6A320340358}"/>
+              </a:ext>
+            </a:extLst>
+          </p:cNvPr>
+          <p:cNvPicPr>
+            <a:picLocks noChangeAspect="1"/>
+          </p:cNvPicPr>
+          <p:nvPr/>
+        </p:nvPicPr>
+        <p:blipFill>
+          <a:blip r:embed="rId3"/>
+          <a:stretch>
+            <a:fillRect/>
+          </a:stretch>
+        </p:blipFill>
+        <p:spPr>
+          <a:xfrm>
+            <a:off x="4938936" y="1612481"/>
+            <a:ext cx="3810000" cy="1355845"/>
+          </a:xfrm>
+          <a:prstGeom prst="rect">
+            <a:avLst/>
+          </a:prstGeom>
+          <a:ln w="19050">
+            <a:solidFill>
+              <a:schemeClr val="accent1"/>
+            </a:solidFill>
+          </a:ln>
+        </p:spPr>
+      </p:pic>
       <p:sp>
         <p:nvSpPr>
           <p:cNvPr id="5" name="Rectangle 4">
@@ -4799,8 +4899,8 @@
         </p:nvSpPr>
         <p:spPr>
           <a:xfrm>
-            <a:off x="4676725" y="3360294"/>
-            <a:ext cx="1858781" cy="449705"/>
+            <a:off x="5708667" y="1976660"/>
+            <a:ext cx="1659182" cy="669312"/>
           </a:xfrm>
           <a:prstGeom prst="rect">
             <a:avLst/>
@@ -4837,6 +4937,50 @@
           </a:p>
         </p:txBody>
       </p:sp>
+      <p:cxnSp>
+        <p:nvCxnSpPr>
+          <p:cNvPr id="8" name="Straight Arrow Connector 7">
+            <a:extLst>
+              <a:ext uri="{FF2B5EF4-FFF2-40B4-BE49-F238E27FC236}">
+                <a16:creationId xmlns:a16="http://schemas.microsoft.com/office/drawing/2014/main" id="{57DB6BC3-ED4F-4FF2-9595-74EC4E55DF21}"/>
+              </a:ext>
+            </a:extLst>
+          </p:cNvPr>
+          <p:cNvCxnSpPr>
+            <a:cxnSpLocks/>
+          </p:cNvCxnSpPr>
+          <p:nvPr/>
+        </p:nvCxnSpPr>
+        <p:spPr>
+          <a:xfrm flipV="1">
+            <a:off x="4123652" y="2311316"/>
+            <a:ext cx="1536919" cy="409415"/>
+          </a:xfrm>
+          <a:prstGeom prst="straightConnector1">
+            <a:avLst/>
+          </a:prstGeom>
+          <a:ln w="38100">
+            <a:solidFill>
+              <a:srgbClr val="FF0000"/>
+            </a:solidFill>
+            <a:tailEnd type="triangle"/>
+          </a:ln>
+        </p:spPr>
+        <p:style>
+          <a:lnRef idx="1">
+            <a:schemeClr val="accent1"/>
+          </a:lnRef>
+          <a:fillRef idx="0">
+            <a:schemeClr val="accent1"/>
+          </a:fillRef>
+          <a:effectRef idx="0">
+            <a:schemeClr val="accent1"/>
+          </a:effectRef>
+          <a:fontRef idx="minor">
+            <a:schemeClr val="tx1"/>
+          </a:fontRef>
+        </p:style>
+      </p:cxnSp>
       <p:sp>
         <p:nvSpPr>
           <p:cNvPr id="6" name="Rectangle 5">
@@ -4851,8 +4995,8 @@
         </p:nvSpPr>
         <p:spPr>
           <a:xfrm>
-            <a:off x="4683760" y="4757960"/>
-            <a:ext cx="2987040" cy="639581"/>
+            <a:off x="4938936" y="4298296"/>
+            <a:ext cx="2696304" cy="810914"/>
           </a:xfrm>
           <a:prstGeom prst="rect">
             <a:avLst/>
@@ -4891,50 +5035,6 @@
       </p:sp>
       <p:cxnSp>
         <p:nvCxnSpPr>
-          <p:cNvPr id="8" name="Straight Arrow Connector 7">
-            <a:extLst>
-              <a:ext uri="{FF2B5EF4-FFF2-40B4-BE49-F238E27FC236}">
-                <a16:creationId xmlns:a16="http://schemas.microsoft.com/office/drawing/2014/main" id="{57DB6BC3-ED4F-4FF2-9595-74EC4E55DF21}"/>
-              </a:ext>
-            </a:extLst>
-          </p:cNvPr>
-          <p:cNvCxnSpPr>
-            <a:cxnSpLocks/>
-          </p:cNvCxnSpPr>
-          <p:nvPr/>
-        </p:nvCxnSpPr>
-        <p:spPr>
-          <a:xfrm>
-            <a:off x="4307801" y="3141689"/>
-            <a:ext cx="264199" cy="218605"/>
-          </a:xfrm>
-          <a:prstGeom prst="straightConnector1">
-            <a:avLst/>
-          </a:prstGeom>
-          <a:ln w="38100">
-            <a:solidFill>
-              <a:srgbClr val="FF0000"/>
-            </a:solidFill>
-            <a:tailEnd type="triangle"/>
-          </a:ln>
-        </p:spPr>
-        <p:style>
-          <a:lnRef idx="1">
-            <a:schemeClr val="accent1"/>
-          </a:lnRef>
-          <a:fillRef idx="0">
-            <a:schemeClr val="accent1"/>
-          </a:fillRef>
-          <a:effectRef idx="0">
-            <a:schemeClr val="accent1"/>
-          </a:effectRef>
-          <a:fontRef idx="minor">
-            <a:schemeClr val="tx1"/>
-          </a:fontRef>
-        </p:style>
-      </p:cxnSp>
-      <p:cxnSp>
-        <p:nvCxnSpPr>
           <p:cNvPr id="9" name="Straight Arrow Connector 8">
             <a:extLst>
               <a:ext uri="{FF2B5EF4-FFF2-40B4-BE49-F238E27FC236}">
@@ -4950,8 +5050,8 @@
         </p:nvCxnSpPr>
         <p:spPr>
           <a:xfrm flipV="1">
-            <a:off x="3759200" y="5077751"/>
-            <a:ext cx="924560" cy="547714"/>
+            <a:off x="4059614" y="4703753"/>
+            <a:ext cx="879322" cy="279727"/>
           </a:xfrm>
           <a:prstGeom prst="straightConnector1">
             <a:avLst/>
@@ -4981,7 +5081,7 @@
     </p:spTree>
     <p:extLst>
       <p:ext uri="{BB962C8B-B14F-4D97-AF65-F5344CB8AC3E}">
-        <p14:creationId xmlns:p14="http://schemas.microsoft.com/office/powerpoint/2010/main" val="3060563647"/>
+        <p14:creationId xmlns:p14="http://schemas.microsoft.com/office/powerpoint/2010/main" val="172792021"/>
       </p:ext>
     </p:extLst>
   </p:cSld>
@@ -5957,37 +6057,12 @@
           </a:p>
         </p:txBody>
       </p:sp>
-      <p:sp>
-        <p:nvSpPr>
-          <p:cNvPr id="3" name="Content Placeholder 2">
+      <p:pic>
+        <p:nvPicPr>
+          <p:cNvPr id="5" name="Picture 4">
             <a:extLst>
               <a:ext uri="{FF2B5EF4-FFF2-40B4-BE49-F238E27FC236}">
-                <a16:creationId xmlns:a16="http://schemas.microsoft.com/office/drawing/2014/main" id="{E744D82A-D243-4D22-9F3B-7F610C8486A2}"/>
-              </a:ext>
-            </a:extLst>
-          </p:cNvPr>
-          <p:cNvSpPr>
-            <a:spLocks noGrp="1"/>
-          </p:cNvSpPr>
-          <p:nvPr>
-            <p:ph idx="1"/>
-          </p:nvPr>
-        </p:nvSpPr>
-        <p:spPr/>
-        <p:txBody>
-          <a:bodyPr/>
-          <a:lstStyle/>
-          <a:p>
-            <a:endParaRPr lang="en-IE"/>
-          </a:p>
-        </p:txBody>
-      </p:sp>
-      <p:pic>
-        <p:nvPicPr>
-          <p:cNvPr id="6" name="Picture 5">
-            <a:extLst>
-              <a:ext uri="{FF2B5EF4-FFF2-40B4-BE49-F238E27FC236}">
-                <a16:creationId xmlns:a16="http://schemas.microsoft.com/office/drawing/2014/main" id="{0DA42AA4-5845-4DA8-88FC-269DEC02E228}"/>
+                <a16:creationId xmlns:a16="http://schemas.microsoft.com/office/drawing/2014/main" id="{B30F6CAE-035E-0C49-99D8-1791D790BB68}"/>
               </a:ext>
             </a:extLst>
           </p:cNvPr>
@@ -6004,17 +6079,12 @@
         </p:blipFill>
         <p:spPr>
           <a:xfrm>
-            <a:off x="322216" y="1886754"/>
-            <a:ext cx="6662057" cy="3611254"/>
+            <a:off x="0" y="1389500"/>
+            <a:ext cx="9144000" cy="4078999"/>
           </a:xfrm>
           <a:prstGeom prst="rect">
             <a:avLst/>
           </a:prstGeom>
-          <a:ln>
-            <a:solidFill>
-              <a:schemeClr val="tx1"/>
-            </a:solidFill>
-          </a:ln>
         </p:spPr>
       </p:pic>
     </p:spTree>
@@ -6047,40 +6117,12 @@
           <a:chExt cx="0" cy="0"/>
         </a:xfrm>
       </p:grpSpPr>
-      <p:sp>
-        <p:nvSpPr>
-          <p:cNvPr id="2" name="Title 1">
+      <p:pic>
+        <p:nvPicPr>
+          <p:cNvPr id="6" name="Picture 5">
             <a:extLst>
               <a:ext uri="{FF2B5EF4-FFF2-40B4-BE49-F238E27FC236}">
-                <a16:creationId xmlns:a16="http://schemas.microsoft.com/office/drawing/2014/main" id="{CF8B1D47-451A-497A-8E5B-6A335CEE419D}"/>
-              </a:ext>
-            </a:extLst>
-          </p:cNvPr>
-          <p:cNvSpPr>
-            <a:spLocks noGrp="1"/>
-          </p:cNvSpPr>
-          <p:nvPr>
-            <p:ph type="title"/>
-          </p:nvPr>
-        </p:nvSpPr>
-        <p:spPr/>
-        <p:txBody>
-          <a:bodyPr/>
-          <a:lstStyle/>
-          <a:p>
-            <a:r>
-              <a:rPr lang="en-IE" dirty="0"/>
-              <a:t>Navigating the Shiny App</a:t>
-            </a:r>
-          </a:p>
-        </p:txBody>
-      </p:sp>
-      <p:pic>
-        <p:nvPicPr>
-          <p:cNvPr id="4" name="Picture 3">
-            <a:extLst>
-              <a:ext uri="{FF2B5EF4-FFF2-40B4-BE49-F238E27FC236}">
-                <a16:creationId xmlns:a16="http://schemas.microsoft.com/office/drawing/2014/main" id="{FD11EB1A-8E94-4F0B-AA79-5430E7A5189E}"/>
+                <a16:creationId xmlns:a16="http://schemas.microsoft.com/office/drawing/2014/main" id="{14B0796F-6BC0-41DB-C9AC-00A364843F7F}"/>
               </a:ext>
             </a:extLst>
           </p:cNvPr>
@@ -6097,19 +6139,42 @@
         </p:blipFill>
         <p:spPr>
           <a:xfrm>
-            <a:off x="209006" y="1524000"/>
-            <a:ext cx="8395063" cy="4132955"/>
+            <a:off x="0" y="1531870"/>
+            <a:ext cx="9144000" cy="3794260"/>
           </a:xfrm>
           <a:prstGeom prst="rect">
             <a:avLst/>
           </a:prstGeom>
-          <a:ln>
-            <a:solidFill>
-              <a:schemeClr val="tx1"/>
-            </a:solidFill>
-          </a:ln>
         </p:spPr>
       </p:pic>
+      <p:sp>
+        <p:nvSpPr>
+          <p:cNvPr id="2" name="Title 1">
+            <a:extLst>
+              <a:ext uri="{FF2B5EF4-FFF2-40B4-BE49-F238E27FC236}">
+                <a16:creationId xmlns:a16="http://schemas.microsoft.com/office/drawing/2014/main" id="{CF8B1D47-451A-497A-8E5B-6A335CEE419D}"/>
+              </a:ext>
+            </a:extLst>
+          </p:cNvPr>
+          <p:cNvSpPr>
+            <a:spLocks noGrp="1"/>
+          </p:cNvSpPr>
+          <p:nvPr>
+            <p:ph type="title"/>
+          </p:nvPr>
+        </p:nvSpPr>
+        <p:spPr/>
+        <p:txBody>
+          <a:bodyPr/>
+          <a:lstStyle/>
+          <a:p>
+            <a:r>
+              <a:rPr lang="en-IE" dirty="0"/>
+              <a:t>Navigating the Shiny App</a:t>
+            </a:r>
+          </a:p>
+        </p:txBody>
+      </p:sp>
       <p:sp>
         <p:nvSpPr>
           <p:cNvPr id="3" name="Content Placeholder 2">
@@ -6128,7 +6193,7 @@
         </p:nvSpPr>
         <p:spPr>
           <a:xfrm>
-            <a:off x="539931" y="4683071"/>
+            <a:off x="1865811" y="5551896"/>
             <a:ext cx="4497977" cy="973884"/>
           </a:xfrm>
           <a:ln>
@@ -6233,7 +6298,7 @@
         </p:blipFill>
         <p:spPr bwMode="auto">
           <a:xfrm>
-            <a:off x="3794807" y="1920240"/>
+            <a:off x="5824926" y="2674620"/>
             <a:ext cx="316794" cy="304800"/>
           </a:xfrm>
           <a:prstGeom prst="rect">
@@ -6261,14 +6326,15 @@
             </a:extLst>
           </p:cNvPr>
           <p:cNvCxnSpPr>
+            <a:cxnSpLocks/>
             <a:stCxn id="3" idx="0"/>
           </p:cNvCxnSpPr>
           <p:nvPr/>
         </p:nvCxnSpPr>
         <p:spPr>
           <a:xfrm flipV="1">
-            <a:off x="2788920" y="2225040"/>
-            <a:ext cx="1103811" cy="2458031"/>
+            <a:off x="4114800" y="2979420"/>
+            <a:ext cx="1805940" cy="2572476"/>
           </a:xfrm>
           <a:prstGeom prst="straightConnector1">
             <a:avLst/>
@@ -6325,65 +6391,12 @@
           <a:chExt cx="0" cy="0"/>
         </a:xfrm>
       </p:grpSpPr>
-      <p:sp>
-        <p:nvSpPr>
-          <p:cNvPr id="2" name="Title 1">
+      <p:pic>
+        <p:nvPicPr>
+          <p:cNvPr id="8" name="Picture 7">
             <a:extLst>
               <a:ext uri="{FF2B5EF4-FFF2-40B4-BE49-F238E27FC236}">
-                <a16:creationId xmlns:a16="http://schemas.microsoft.com/office/drawing/2014/main" id="{A97E18B7-A5F4-411E-96FC-C4656013962F}"/>
-              </a:ext>
-            </a:extLst>
-          </p:cNvPr>
-          <p:cNvSpPr>
-            <a:spLocks noGrp="1"/>
-          </p:cNvSpPr>
-          <p:nvPr>
-            <p:ph type="title"/>
-          </p:nvPr>
-        </p:nvSpPr>
-        <p:spPr/>
-        <p:txBody>
-          <a:bodyPr/>
-          <a:lstStyle/>
-          <a:p>
-            <a:r>
-              <a:rPr lang="en-IE" dirty="0"/>
-              <a:t>Answer questions</a:t>
-            </a:r>
-          </a:p>
-        </p:txBody>
-      </p:sp>
-      <p:sp>
-        <p:nvSpPr>
-          <p:cNvPr id="3" name="Content Placeholder 2">
-            <a:extLst>
-              <a:ext uri="{FF2B5EF4-FFF2-40B4-BE49-F238E27FC236}">
-                <a16:creationId xmlns:a16="http://schemas.microsoft.com/office/drawing/2014/main" id="{3CC629C3-E95E-4BFC-9941-035163E7FBBA}"/>
-              </a:ext>
-            </a:extLst>
-          </p:cNvPr>
-          <p:cNvSpPr>
-            <a:spLocks noGrp="1"/>
-          </p:cNvSpPr>
-          <p:nvPr>
-            <p:ph idx="1"/>
-          </p:nvPr>
-        </p:nvSpPr>
-        <p:spPr/>
-        <p:txBody>
-          <a:bodyPr/>
-          <a:lstStyle/>
-          <a:p>
-            <a:endParaRPr lang="en-IE" dirty="0"/>
-          </a:p>
-        </p:txBody>
-      </p:sp>
-      <p:pic>
-        <p:nvPicPr>
-          <p:cNvPr id="4" name="Picture 3">
-            <a:extLst>
-              <a:ext uri="{FF2B5EF4-FFF2-40B4-BE49-F238E27FC236}">
-                <a16:creationId xmlns:a16="http://schemas.microsoft.com/office/drawing/2014/main" id="{891113D0-39DF-47A4-8ACD-EB9219A4A49E}"/>
+                <a16:creationId xmlns:a16="http://schemas.microsoft.com/office/drawing/2014/main" id="{53DF96D8-1560-4249-05B4-1F5C1DA31F1F}"/>
               </a:ext>
             </a:extLst>
           </p:cNvPr>
@@ -6400,19 +6413,42 @@
         </p:blipFill>
         <p:spPr>
           <a:xfrm>
-            <a:off x="600890" y="1524000"/>
-            <a:ext cx="6836229" cy="4190367"/>
+            <a:off x="457200" y="1599541"/>
+            <a:ext cx="5992061" cy="4725059"/>
           </a:xfrm>
           <a:prstGeom prst="rect">
             <a:avLst/>
           </a:prstGeom>
-          <a:ln>
-            <a:solidFill>
-              <a:schemeClr val="tx1"/>
-            </a:solidFill>
-          </a:ln>
         </p:spPr>
       </p:pic>
+      <p:sp>
+        <p:nvSpPr>
+          <p:cNvPr id="2" name="Title 1">
+            <a:extLst>
+              <a:ext uri="{FF2B5EF4-FFF2-40B4-BE49-F238E27FC236}">
+                <a16:creationId xmlns:a16="http://schemas.microsoft.com/office/drawing/2014/main" id="{A97E18B7-A5F4-411E-96FC-C4656013962F}"/>
+              </a:ext>
+            </a:extLst>
+          </p:cNvPr>
+          <p:cNvSpPr>
+            <a:spLocks noGrp="1"/>
+          </p:cNvSpPr>
+          <p:nvPr>
+            <p:ph type="title"/>
+          </p:nvPr>
+        </p:nvSpPr>
+        <p:spPr/>
+        <p:txBody>
+          <a:bodyPr/>
+          <a:lstStyle/>
+          <a:p>
+            <a:r>
+              <a:rPr lang="en-IE" dirty="0"/>
+              <a:t>Answer questions</a:t>
+            </a:r>
+          </a:p>
+        </p:txBody>
+      </p:sp>
       <p:sp>
         <p:nvSpPr>
           <p:cNvPr id="5" name="Content Placeholder 2">
@@ -6429,7 +6465,7 @@
         </p:nvSpPr>
         <p:spPr>
           <a:xfrm>
-            <a:off x="3977638" y="2714916"/>
+            <a:off x="4619893" y="3429000"/>
             <a:ext cx="4497977" cy="973884"/>
           </a:xfrm>
           <a:prstGeom prst="rect">
@@ -6635,7 +6671,7 @@
             </a:pPr>
             <a:r>
               <a:rPr lang="en-IE" dirty="0"/>
-              <a:t>Type your answers into the text boxes</a:t>
+              <a:t>Type your answers into the text boxes and select answers</a:t>
             </a:r>
           </a:p>
         </p:txBody>
@@ -6657,8 +6693,8 @@
         </p:nvCxnSpPr>
         <p:spPr>
           <a:xfrm flipH="1">
-            <a:off x="3335383" y="3688800"/>
-            <a:ext cx="2891244" cy="830949"/>
+            <a:off x="1897380" y="4402884"/>
+            <a:ext cx="4971502" cy="271986"/>
           </a:xfrm>
           <a:prstGeom prst="straightConnector1">
             <a:avLst/>
@@ -6685,6 +6721,92 @@
           </a:fontRef>
         </p:style>
       </p:cxnSp>
+      <p:pic>
+        <p:nvPicPr>
+          <p:cNvPr id="9" name="Picture 4" descr="Image result for windows hand pointer icon png">
+            <a:extLst>
+              <a:ext uri="{FF2B5EF4-FFF2-40B4-BE49-F238E27FC236}">
+                <a16:creationId xmlns:a16="http://schemas.microsoft.com/office/drawing/2014/main" id="{C8042795-3257-9E07-A499-B69CB756BBA7}"/>
+              </a:ext>
+            </a:extLst>
+          </p:cNvPr>
+          <p:cNvPicPr>
+            <a:picLocks noChangeAspect="1" noChangeArrowheads="1"/>
+          </p:cNvPicPr>
+          <p:nvPr/>
+        </p:nvPicPr>
+        <p:blipFill>
+          <a:blip r:embed="rId3">
+            <a:extLst>
+              <a:ext uri="{BEBA8EAE-BF5A-486C-A8C5-ECC9F3942E4B}">
+                <a14:imgProps xmlns:a14="http://schemas.microsoft.com/office/drawing/2010/main">
+                  <a14:imgLayer r:embed="rId4">
+                    <a14:imgEffect>
+                      <a14:backgroundRemoval t="5957" b="93663" l="10000" r="90000">
+                        <a14:foregroundMark x1="36707" y1="23194" x2="35366" y2="47402"/>
+                        <a14:foregroundMark x1="35366" y1="47402" x2="48415" y2="67554"/>
+                        <a14:foregroundMark x1="48415" y1="67554" x2="52073" y2="69708"/>
+                        <a14:foregroundMark x1="37195" y1="75792" x2="37927" y2="64385"/>
+                        <a14:foregroundMark x1="37927" y1="64385" x2="38902" y2="62484"/>
+                        <a14:foregroundMark x1="50976" y1="81369" x2="66463" y2="65653"/>
+                        <a14:foregroundMark x1="66463" y1="65653" x2="77805" y2="59316"/>
+                        <a14:foregroundMark x1="77805" y1="59316" x2="81463" y2="53359"/>
+                        <a14:foregroundMark x1="81463" y1="53359" x2="80488" y2="45881"/>
+                        <a14:foregroundMark x1="80488" y1="45881" x2="79512" y2="44994"/>
+                        <a14:foregroundMark x1="71951" y1="56147" x2="67927" y2="47022"/>
+                        <a14:foregroundMark x1="67927" y1="47022" x2="66951" y2="39670"/>
+                        <a14:foregroundMark x1="66951" y1="39670" x2="66463" y2="39544"/>
+                        <a14:foregroundMark x1="54634" y1="34728" x2="53902" y2="56401"/>
+                        <a14:foregroundMark x1="53902" y1="56401" x2="55610" y2="61343"/>
+                        <a14:foregroundMark x1="41585" y1="14068" x2="44146" y2="54499"/>
+                        <a14:foregroundMark x1="45244" y1="90748" x2="55610" y2="90368"/>
+                        <a14:foregroundMark x1="55610" y1="90368" x2="64756" y2="90494"/>
+                        <a14:foregroundMark x1="64756" y1="90494" x2="72561" y2="89987"/>
+                        <a14:foregroundMark x1="72561" y1="89987" x2="77317" y2="87706"/>
+                        <a14:foregroundMark x1="72317" y1="93663" x2="50366" y2="93663"/>
+                        <a14:foregroundMark x1="42073" y1="72624" x2="44634" y2="79975"/>
+                        <a14:foregroundMark x1="44634" y1="79975" x2="54756" y2="84918"/>
+                        <a14:foregroundMark x1="54756" y1="84918" x2="65122" y2="86692"/>
+                        <a14:foregroundMark x1="65122" y1="86692" x2="68171" y2="86058"/>
+                        <a14:foregroundMark x1="77561" y1="66033" x2="71341" y2="78454"/>
+                        <a14:foregroundMark x1="71341" y1="78454" x2="70122" y2="79468"/>
+                        <a14:foregroundMark x1="25976" y1="50824" x2="35488" y2="63498"/>
+                        <a14:foregroundMark x1="42683" y1="5957" x2="42683" y2="7351"/>
+                      </a14:backgroundRemoval>
+                    </a14:imgEffect>
+                  </a14:imgLayer>
+                </a14:imgProps>
+              </a:ext>
+              <a:ext uri="{28A0092B-C50C-407E-A947-70E740481C1C}">
+                <a14:useLocalDpi xmlns:a14="http://schemas.microsoft.com/office/drawing/2010/main" val="0"/>
+              </a:ext>
+            </a:extLst>
+          </a:blip>
+          <a:srcRect/>
+          <a:stretch>
+            <a:fillRect/>
+          </a:stretch>
+        </p:blipFill>
+        <p:spPr bwMode="auto">
+          <a:xfrm>
+            <a:off x="1349304" y="4500875"/>
+            <a:ext cx="316794" cy="304800"/>
+          </a:xfrm>
+          <a:prstGeom prst="rect">
+            <a:avLst/>
+          </a:prstGeom>
+          <a:noFill/>
+          <a:extLst>
+            <a:ext uri="{909E8E84-426E-40DD-AFC4-6F175D3DCCD1}">
+              <a14:hiddenFill xmlns:a14="http://schemas.microsoft.com/office/drawing/2010/main">
+                <a:solidFill>
+                  <a:srgbClr val="FFFFFF"/>
+                </a:solidFill>
+              </a14:hiddenFill>
+            </a:ext>
+          </a:extLst>
+        </p:spPr>
+      </p:pic>
     </p:spTree>
     <p:extLst>
       <p:ext uri="{BB962C8B-B14F-4D97-AF65-F5344CB8AC3E}">
@@ -6717,10 +6839,10 @@
       </p:grpSpPr>
       <p:pic>
         <p:nvPicPr>
-          <p:cNvPr id="9" name="Picture 8">
+          <p:cNvPr id="4" name="Picture 3">
             <a:extLst>
               <a:ext uri="{FF2B5EF4-FFF2-40B4-BE49-F238E27FC236}">
-                <a16:creationId xmlns:a16="http://schemas.microsoft.com/office/drawing/2014/main" id="{92FF6E76-025C-4C78-95D2-B42893CD130F}"/>
+                <a16:creationId xmlns:a16="http://schemas.microsoft.com/office/drawing/2014/main" id="{41C5D765-B374-F5DA-285B-AABFDD6A1FD1}"/>
               </a:ext>
             </a:extLst>
           </p:cNvPr>
@@ -6737,17 +6859,12 @@
         </p:blipFill>
         <p:spPr>
           <a:xfrm>
-            <a:off x="203706" y="1868708"/>
-            <a:ext cx="7630596" cy="4074978"/>
+            <a:off x="91440" y="2282592"/>
+            <a:ext cx="9144000" cy="3481536"/>
           </a:xfrm>
           <a:prstGeom prst="rect">
             <a:avLst/>
           </a:prstGeom>
-          <a:ln>
-            <a:solidFill>
-              <a:schemeClr val="tx1"/>
-            </a:solidFill>
-          </a:ln>
         </p:spPr>
       </p:pic>
       <p:sp>
@@ -7023,7 +7140,7 @@
         <p:spPr>
           <a:xfrm>
             <a:off x="6313712" y="1600200"/>
-            <a:ext cx="801191" cy="2606040"/>
+            <a:ext cx="2041618" cy="2423160"/>
           </a:xfrm>
           <a:prstGeom prst="straightConnector1">
             <a:avLst/>
@@ -7118,7 +7235,7 @@
         </p:blipFill>
         <p:spPr bwMode="auto">
           <a:xfrm>
-            <a:off x="7000051" y="4348475"/>
+            <a:off x="8226314" y="4196075"/>
             <a:ext cx="316794" cy="304800"/>
           </a:xfrm>
           <a:prstGeom prst="rect">
@@ -7168,10 +7285,10 @@
       </p:grpSpPr>
       <p:pic>
         <p:nvPicPr>
-          <p:cNvPr id="3" name="Picture 2">
+          <p:cNvPr id="7" name="Picture 6">
             <a:extLst>
               <a:ext uri="{FF2B5EF4-FFF2-40B4-BE49-F238E27FC236}">
-                <a16:creationId xmlns:a16="http://schemas.microsoft.com/office/drawing/2014/main" id="{E7F8291E-D7E2-4E42-8B4F-B1258AF5F4D5}"/>
+                <a16:creationId xmlns:a16="http://schemas.microsoft.com/office/drawing/2014/main" id="{702E4F4C-A655-E9F0-BAF1-1BAF70834FBE}"/>
               </a:ext>
             </a:extLst>
           </p:cNvPr>
@@ -7188,17 +7305,12 @@
         </p:blipFill>
         <p:spPr>
           <a:xfrm>
-            <a:off x="783241" y="1693116"/>
-            <a:ext cx="7402815" cy="3929144"/>
+            <a:off x="365760" y="1648091"/>
+            <a:ext cx="8103870" cy="4461111"/>
           </a:xfrm>
           <a:prstGeom prst="rect">
             <a:avLst/>
           </a:prstGeom>
-          <a:ln>
-            <a:solidFill>
-              <a:schemeClr val="tx1"/>
-            </a:solidFill>
-          </a:ln>
         </p:spPr>
       </p:pic>
       <p:sp>
@@ -7619,10 +7731,10 @@
       </p:grpSpPr>
       <p:pic>
         <p:nvPicPr>
-          <p:cNvPr id="4" name="Picture 3">
+          <p:cNvPr id="7" name="Picture 6">
             <a:extLst>
               <a:ext uri="{FF2B5EF4-FFF2-40B4-BE49-F238E27FC236}">
-                <a16:creationId xmlns:a16="http://schemas.microsoft.com/office/drawing/2014/main" id="{803F8A3A-3264-4810-ACBC-1426125071A4}"/>
+                <a16:creationId xmlns:a16="http://schemas.microsoft.com/office/drawing/2014/main" id="{162B91E6-0515-20BF-3640-E43962B1AF2F}"/>
               </a:ext>
             </a:extLst>
           </p:cNvPr>
@@ -7631,24 +7743,20 @@
           </p:cNvPicPr>
           <p:nvPr/>
         </p:nvPicPr>
-        <p:blipFill rotWithShape="1">
+        <p:blipFill>
           <a:blip r:embed="rId2"/>
-          <a:srcRect b="4373"/>
-          <a:stretch/>
+          <a:stretch>
+            <a:fillRect/>
+          </a:stretch>
         </p:blipFill>
         <p:spPr>
           <a:xfrm>
-            <a:off x="585788" y="1386538"/>
-            <a:ext cx="7525282" cy="4045872"/>
+            <a:off x="1097280" y="1244908"/>
+            <a:ext cx="7432910" cy="4633270"/>
           </a:xfrm>
           <a:prstGeom prst="rect">
             <a:avLst/>
           </a:prstGeom>
-          <a:ln>
-            <a:solidFill>
-              <a:schemeClr val="tx1"/>
-            </a:solidFill>
-          </a:ln>
         </p:spPr>
       </p:pic>
       <p:sp>
@@ -7923,8 +8031,8 @@
         </p:nvCxnSpPr>
         <p:spPr>
           <a:xfrm flipH="1" flipV="1">
-            <a:off x="6696892" y="2943498"/>
-            <a:ext cx="441960" cy="2669594"/>
+            <a:off x="6503125" y="2103120"/>
+            <a:ext cx="635727" cy="3509972"/>
           </a:xfrm>
           <a:prstGeom prst="straightConnector1">
             <a:avLst/>
@@ -8339,41 +8447,6 @@
           <a:chExt cx="0" cy="0"/>
         </a:xfrm>
       </p:grpSpPr>
-      <p:pic>
-        <p:nvPicPr>
-          <p:cNvPr id="7" name="Picture 6">
-            <a:extLst>
-              <a:ext uri="{FF2B5EF4-FFF2-40B4-BE49-F238E27FC236}">
-                <a16:creationId xmlns:a16="http://schemas.microsoft.com/office/drawing/2014/main" id="{B26F73F9-C1C0-415B-B591-CB019B8240EF}"/>
-              </a:ext>
-            </a:extLst>
-          </p:cNvPr>
-          <p:cNvPicPr>
-            <a:picLocks noChangeAspect="1"/>
-          </p:cNvPicPr>
-          <p:nvPr/>
-        </p:nvPicPr>
-        <p:blipFill>
-          <a:blip r:embed="rId2"/>
-          <a:stretch>
-            <a:fillRect/>
-          </a:stretch>
-        </p:blipFill>
-        <p:spPr>
-          <a:xfrm>
-            <a:off x="297735" y="1500618"/>
-            <a:ext cx="8548529" cy="4053291"/>
-          </a:xfrm>
-          <a:prstGeom prst="rect">
-            <a:avLst/>
-          </a:prstGeom>
-          <a:ln>
-            <a:solidFill>
-              <a:schemeClr val="tx1"/>
-            </a:solidFill>
-          </a:ln>
-        </p:spPr>
-      </p:pic>
       <p:sp>
         <p:nvSpPr>
           <p:cNvPr id="2" name="Title 1">
@@ -8659,8 +8732,8 @@
         </p:nvCxnSpPr>
         <p:spPr>
           <a:xfrm flipV="1">
-            <a:off x="3007722" y="5357382"/>
-            <a:ext cx="2491735" cy="480276"/>
+            <a:off x="3007722" y="4956731"/>
+            <a:ext cx="3895998" cy="880927"/>
           </a:xfrm>
           <a:prstGeom prst="straightConnector1">
             <a:avLst/>
@@ -8687,6 +8760,36 @@
           </a:fontRef>
         </p:style>
       </p:cxnSp>
+      <p:pic>
+        <p:nvPicPr>
+          <p:cNvPr id="4" name="Picture 3">
+            <a:extLst>
+              <a:ext uri="{FF2B5EF4-FFF2-40B4-BE49-F238E27FC236}">
+                <a16:creationId xmlns:a16="http://schemas.microsoft.com/office/drawing/2014/main" id="{54569DB4-F828-3897-15C6-2C197517C620}"/>
+              </a:ext>
+            </a:extLst>
+          </p:cNvPr>
+          <p:cNvPicPr>
+            <a:picLocks noChangeAspect="1"/>
+          </p:cNvPicPr>
+          <p:nvPr/>
+        </p:nvPicPr>
+        <p:blipFill>
+          <a:blip r:embed="rId2"/>
+          <a:stretch>
+            <a:fillRect/>
+          </a:stretch>
+        </p:blipFill>
+        <p:spPr>
+          <a:xfrm>
+            <a:off x="0" y="1901269"/>
+            <a:ext cx="9144000" cy="3055462"/>
+          </a:xfrm>
+          <a:prstGeom prst="rect">
+            <a:avLst/>
+          </a:prstGeom>
+        </p:spPr>
+      </p:pic>
       <p:pic>
         <p:nvPicPr>
           <p:cNvPr id="10" name="Picture 4" descr="Image result for windows hand pointer icon png">
@@ -8755,7 +8858,7 @@
         </p:blipFill>
         <p:spPr bwMode="auto">
           <a:xfrm>
-            <a:off x="5499457" y="5204982"/>
+            <a:off x="7099657" y="4876800"/>
             <a:ext cx="316794" cy="304800"/>
           </a:xfrm>
           <a:prstGeom prst="rect">

</xml_diff>